<commit_message>
P6 stuff added. More due.
</commit_message>
<xml_diff>
--- a/ee521_julia_plan.pptx
+++ b/ee521_julia_plan.pptx
@@ -40,9 +40,11 @@
     <p:sldId id="263" r:id="rId37"/>
     <p:sldId id="269" r:id="rId38"/>
     <p:sldId id="262" r:id="rId39"/>
-    <p:sldId id="272" r:id="rId40"/>
-    <p:sldId id="258" r:id="rId41"/>
-    <p:sldId id="273" r:id="rId42"/>
+    <p:sldId id="299" r:id="rId40"/>
+    <p:sldId id="298" r:id="rId41"/>
+    <p:sldId id="272" r:id="rId42"/>
+    <p:sldId id="258" r:id="rId43"/>
+    <p:sldId id="273" r:id="rId44"/>
   </p:sldIdLst>
   <p:sldSz cx="12192000" cy="6858000"/>
   <p:notesSz cx="6858000" cy="9144000"/>
@@ -152,7 +154,7 @@
 <file path=ppt/revisionInfo.xml><?xml version="1.0" encoding="utf-8"?>
 <p1510:revInfo xmlns:a="http://schemas.openxmlformats.org/drawingml/2006/main" xmlns:r="http://schemas.openxmlformats.org/officeDocument/2006/relationships" xmlns:p1510="http://schemas.microsoft.com/office/powerpoint/2015/10/main">
   <p1510:revLst>
-    <p1510:client id="{59271A2F-800F-4122-AAC7-0E7320B692D6}" v="22" dt="2023-06-06T05:23:05.912"/>
+    <p1510:client id="{59271A2F-800F-4122-AAC7-0E7320B692D6}" v="370" dt="2023-06-07T00:43:57.385"/>
   </p1510:revLst>
 </p1510:revInfo>
 </file>
@@ -161,11 +163,26 @@
 <pc:chgInfo xmlns:a="http://schemas.openxmlformats.org/drawingml/2006/main" xmlns:r="http://schemas.openxmlformats.org/officeDocument/2006/relationships" xmlns:ac="http://schemas.microsoft.com/office/drawing/2013/main/command" xmlns:pc="http://schemas.microsoft.com/office/powerpoint/2013/main/command">
   <pc:docChgLst>
     <pc:chgData name="Jha, Aryan Ritwajeet" userId="2aad577e-539b-449b-83a6-8d411f484b4d" providerId="ADAL" clId="{59271A2F-800F-4122-AAC7-0E7320B692D6}"/>
-    <pc:docChg chg="modSld">
-      <pc:chgData name="Jha, Aryan Ritwajeet" userId="2aad577e-539b-449b-83a6-8d411f484b4d" providerId="ADAL" clId="{59271A2F-800F-4122-AAC7-0E7320B692D6}" dt="2023-06-06T05:23:01.524" v="20" actId="20577"/>
+    <pc:docChg chg="undo custSel addSld modSld">
+      <pc:chgData name="Jha, Aryan Ritwajeet" userId="2aad577e-539b-449b-83a6-8d411f484b4d" providerId="ADAL" clId="{59271A2F-800F-4122-AAC7-0E7320B692D6}" dt="2023-06-07T00:43:57.384" v="1467" actId="20577"/>
       <pc:docMkLst>
         <pc:docMk/>
       </pc:docMkLst>
+      <pc:sldChg chg="modSp mod">
+        <pc:chgData name="Jha, Aryan Ritwajeet" userId="2aad577e-539b-449b-83a6-8d411f484b4d" providerId="ADAL" clId="{59271A2F-800F-4122-AAC7-0E7320B692D6}" dt="2023-06-07T00:31:11.551" v="853" actId="207"/>
+        <pc:sldMkLst>
+          <pc:docMk/>
+          <pc:sldMk cId="740687609" sldId="272"/>
+        </pc:sldMkLst>
+        <pc:graphicFrameChg chg="modGraphic">
+          <ac:chgData name="Jha, Aryan Ritwajeet" userId="2aad577e-539b-449b-83a6-8d411f484b4d" providerId="ADAL" clId="{59271A2F-800F-4122-AAC7-0E7320B692D6}" dt="2023-06-07T00:31:11.551" v="853" actId="207"/>
+          <ac:graphicFrameMkLst>
+            <pc:docMk/>
+            <pc:sldMk cId="740687609" sldId="272"/>
+            <ac:graphicFrameMk id="4" creationId="{779F6E6E-7735-8C19-7280-5EAF56FF77CD}"/>
+          </ac:graphicFrameMkLst>
+        </pc:graphicFrameChg>
+      </pc:sldChg>
       <pc:sldChg chg="modSp mod">
         <pc:chgData name="Jha, Aryan Ritwajeet" userId="2aad577e-539b-449b-83a6-8d411f484b4d" providerId="ADAL" clId="{59271A2F-800F-4122-AAC7-0E7320B692D6}" dt="2023-06-06T05:23:01.524" v="20" actId="20577"/>
         <pc:sldMkLst>
@@ -178,6 +195,44 @@
             <pc:docMk/>
             <pc:sldMk cId="1141745103" sldId="294"/>
             <ac:spMk id="3" creationId="{3867C106-46B0-FE1A-BABF-5078A19ABE82}"/>
+          </ac:spMkLst>
+        </pc:spChg>
+      </pc:sldChg>
+      <pc:sldChg chg="modSp new mod">
+        <pc:chgData name="Jha, Aryan Ritwajeet" userId="2aad577e-539b-449b-83a6-8d411f484b4d" providerId="ADAL" clId="{59271A2F-800F-4122-AAC7-0E7320B692D6}" dt="2023-06-07T00:32:19.442" v="933" actId="207"/>
+        <pc:sldMkLst>
+          <pc:docMk/>
+          <pc:sldMk cId="753531470" sldId="298"/>
+        </pc:sldMkLst>
+        <pc:spChg chg="mod">
+          <ac:chgData name="Jha, Aryan Ritwajeet" userId="2aad577e-539b-449b-83a6-8d411f484b4d" providerId="ADAL" clId="{59271A2F-800F-4122-AAC7-0E7320B692D6}" dt="2023-06-07T00:31:22.468" v="854" actId="207"/>
+          <ac:spMkLst>
+            <pc:docMk/>
+            <pc:sldMk cId="753531470" sldId="298"/>
+            <ac:spMk id="2" creationId="{A6356650-F690-31BC-E5AD-5EA5C723EE0C}"/>
+          </ac:spMkLst>
+        </pc:spChg>
+        <pc:spChg chg="mod">
+          <ac:chgData name="Jha, Aryan Ritwajeet" userId="2aad577e-539b-449b-83a6-8d411f484b4d" providerId="ADAL" clId="{59271A2F-800F-4122-AAC7-0E7320B692D6}" dt="2023-06-07T00:32:19.442" v="933" actId="207"/>
+          <ac:spMkLst>
+            <pc:docMk/>
+            <pc:sldMk cId="753531470" sldId="298"/>
+            <ac:spMk id="3" creationId="{19EAD700-9CB1-1ED7-248D-4D43669823A8}"/>
+          </ac:spMkLst>
+        </pc:spChg>
+      </pc:sldChg>
+      <pc:sldChg chg="modSp add mod">
+        <pc:chgData name="Jha, Aryan Ritwajeet" userId="2aad577e-539b-449b-83a6-8d411f484b4d" providerId="ADAL" clId="{59271A2F-800F-4122-AAC7-0E7320B692D6}" dt="2023-06-07T00:43:57.384" v="1467" actId="20577"/>
+        <pc:sldMkLst>
+          <pc:docMk/>
+          <pc:sldMk cId="928494366" sldId="299"/>
+        </pc:sldMkLst>
+        <pc:spChg chg="mod">
+          <ac:chgData name="Jha, Aryan Ritwajeet" userId="2aad577e-539b-449b-83a6-8d411f484b4d" providerId="ADAL" clId="{59271A2F-800F-4122-AAC7-0E7320B692D6}" dt="2023-06-07T00:43:57.384" v="1467" actId="20577"/>
+          <ac:spMkLst>
+            <pc:docMk/>
+            <pc:sldMk cId="928494366" sldId="299"/>
+            <ac:spMk id="3" creationId="{B248B06E-0246-4FEF-533A-B0C46C596083}"/>
           </ac:spMkLst>
         </pc:spChg>
       </pc:sldChg>
@@ -3378,7 +3433,7 @@
           <a:p>
             <a:fld id="{CD0EE7A6-4846-4730-80C3-BA00371415CC}" type="datetimeFigureOut">
               <a:rPr lang="en-IN" smtClean="0"/>
-              <a:t>05-06-2023</a:t>
+              <a:t>06-06-2023</a:t>
             </a:fld>
             <a:endParaRPr lang="en-IN"/>
           </a:p>
@@ -3578,7 +3633,7 @@
           <a:p>
             <a:fld id="{CD0EE7A6-4846-4730-80C3-BA00371415CC}" type="datetimeFigureOut">
               <a:rPr lang="en-IN" smtClean="0"/>
-              <a:t>05-06-2023</a:t>
+              <a:t>06-06-2023</a:t>
             </a:fld>
             <a:endParaRPr lang="en-IN"/>
           </a:p>
@@ -3788,7 +3843,7 @@
           <a:p>
             <a:fld id="{CD0EE7A6-4846-4730-80C3-BA00371415CC}" type="datetimeFigureOut">
               <a:rPr lang="en-IN" smtClean="0"/>
-              <a:t>05-06-2023</a:t>
+              <a:t>06-06-2023</a:t>
             </a:fld>
             <a:endParaRPr lang="en-IN"/>
           </a:p>
@@ -3988,7 +4043,7 @@
           <a:p>
             <a:fld id="{CD0EE7A6-4846-4730-80C3-BA00371415CC}" type="datetimeFigureOut">
               <a:rPr lang="en-IN" smtClean="0"/>
-              <a:t>05-06-2023</a:t>
+              <a:t>06-06-2023</a:t>
             </a:fld>
             <a:endParaRPr lang="en-IN"/>
           </a:p>
@@ -4264,7 +4319,7 @@
           <a:p>
             <a:fld id="{CD0EE7A6-4846-4730-80C3-BA00371415CC}" type="datetimeFigureOut">
               <a:rPr lang="en-IN" smtClean="0"/>
-              <a:t>05-06-2023</a:t>
+              <a:t>06-06-2023</a:t>
             </a:fld>
             <a:endParaRPr lang="en-IN"/>
           </a:p>
@@ -4532,7 +4587,7 @@
           <a:p>
             <a:fld id="{CD0EE7A6-4846-4730-80C3-BA00371415CC}" type="datetimeFigureOut">
               <a:rPr lang="en-IN" smtClean="0"/>
-              <a:t>05-06-2023</a:t>
+              <a:t>06-06-2023</a:t>
             </a:fld>
             <a:endParaRPr lang="en-IN"/>
           </a:p>
@@ -4947,7 +5002,7 @@
           <a:p>
             <a:fld id="{CD0EE7A6-4846-4730-80C3-BA00371415CC}" type="datetimeFigureOut">
               <a:rPr lang="en-IN" smtClean="0"/>
-              <a:t>05-06-2023</a:t>
+              <a:t>06-06-2023</a:t>
             </a:fld>
             <a:endParaRPr lang="en-IN"/>
           </a:p>
@@ -5089,7 +5144,7 @@
           <a:p>
             <a:fld id="{CD0EE7A6-4846-4730-80C3-BA00371415CC}" type="datetimeFigureOut">
               <a:rPr lang="en-IN" smtClean="0"/>
-              <a:t>05-06-2023</a:t>
+              <a:t>06-06-2023</a:t>
             </a:fld>
             <a:endParaRPr lang="en-IN"/>
           </a:p>
@@ -5202,7 +5257,7 @@
           <a:p>
             <a:fld id="{CD0EE7A6-4846-4730-80C3-BA00371415CC}" type="datetimeFigureOut">
               <a:rPr lang="en-IN" smtClean="0"/>
-              <a:t>05-06-2023</a:t>
+              <a:t>06-06-2023</a:t>
             </a:fld>
             <a:endParaRPr lang="en-IN"/>
           </a:p>
@@ -5515,7 +5570,7 @@
           <a:p>
             <a:fld id="{CD0EE7A6-4846-4730-80C3-BA00371415CC}" type="datetimeFigureOut">
               <a:rPr lang="en-IN" smtClean="0"/>
-              <a:t>05-06-2023</a:t>
+              <a:t>06-06-2023</a:t>
             </a:fld>
             <a:endParaRPr lang="en-IN"/>
           </a:p>
@@ -5804,7 +5859,7 @@
           <a:p>
             <a:fld id="{CD0EE7A6-4846-4730-80C3-BA00371415CC}" type="datetimeFigureOut">
               <a:rPr lang="en-IN" smtClean="0"/>
-              <a:t>05-06-2023</a:t>
+              <a:t>06-06-2023</a:t>
             </a:fld>
             <a:endParaRPr lang="en-IN"/>
           </a:p>
@@ -6047,7 +6102,7 @@
           <a:p>
             <a:fld id="{CD0EE7A6-4846-4730-80C3-BA00371415CC}" type="datetimeFigureOut">
               <a:rPr lang="en-IN" smtClean="0"/>
-              <a:t>05-06-2023</a:t>
+              <a:t>06-06-2023</a:t>
             </a:fld>
             <a:endParaRPr lang="en-IN"/>
           </a:p>
@@ -11098,8 +11153,8 @@
           </a:p>
         </p:txBody>
       </p:sp>
-      <mc:AlternateContent xmlns:mc="http://schemas.openxmlformats.org/markup-compatibility/2006">
-        <mc:Choice xmlns:a14="http://schemas.microsoft.com/office/drawing/2010/main" Requires="a14">
+      <mc:AlternateContent xmlns:mc="http://schemas.openxmlformats.org/markup-compatibility/2006" xmlns:a14="http://schemas.microsoft.com/office/drawing/2010/main">
+        <mc:Choice Requires="a14">
           <p:sp>
             <p:nvSpPr>
               <p:cNvPr id="3" name="Content Placeholder 2">
@@ -11204,7 +11259,7 @@
             </p:txBody>
           </p:sp>
         </mc:Choice>
-        <mc:Fallback>
+        <mc:Fallback xmlns="">
           <p:sp>
             <p:nvSpPr>
               <p:cNvPr id="3" name="Content Placeholder 2">
@@ -11567,8 +11622,8 @@
           </a:p>
         </p:txBody>
       </p:sp>
-      <mc:AlternateContent xmlns:mc="http://schemas.openxmlformats.org/markup-compatibility/2006">
-        <mc:Choice xmlns:a14="http://schemas.microsoft.com/office/drawing/2010/main" Requires="a14">
+      <mc:AlternateContent xmlns:mc="http://schemas.openxmlformats.org/markup-compatibility/2006" xmlns:a14="http://schemas.microsoft.com/office/drawing/2010/main">
+        <mc:Choice Requires="a14">
           <p:sp>
             <p:nvSpPr>
               <p:cNvPr id="5" name="Content Placeholder 4">
@@ -12240,7 +12295,7 @@
             </p:txBody>
           </p:sp>
         </mc:Choice>
-        <mc:Fallback>
+        <mc:Fallback xmlns="">
           <p:sp>
             <p:nvSpPr>
               <p:cNvPr id="5" name="Content Placeholder 4">
@@ -12413,8 +12468,8 @@
           </a:p>
         </p:txBody>
       </p:sp>
-      <mc:AlternateContent xmlns:mc="http://schemas.openxmlformats.org/markup-compatibility/2006">
-        <mc:Choice xmlns:a14="http://schemas.microsoft.com/office/drawing/2010/main" Requires="a14">
+      <mc:AlternateContent xmlns:mc="http://schemas.openxmlformats.org/markup-compatibility/2006" xmlns:a14="http://schemas.microsoft.com/office/drawing/2010/main">
+        <mc:Choice Requires="a14">
           <p:sp>
             <p:nvSpPr>
               <p:cNvPr id="3" name="Content Placeholder 2">
@@ -12831,7 +12886,7 @@
             </p:txBody>
           </p:sp>
         </mc:Choice>
-        <mc:Fallback>
+        <mc:Fallback xmlns="">
           <p:sp>
             <p:nvSpPr>
               <p:cNvPr id="3" name="Content Placeholder 2">
@@ -16802,7 +16857,7 @@
           <p:cNvPr id="2" name="Title 1">
             <a:extLst>
               <a:ext uri="{FF2B5EF4-FFF2-40B4-BE49-F238E27FC236}">
-                <a16:creationId xmlns:a16="http://schemas.microsoft.com/office/drawing/2014/main" id="{CB8D80A0-3C5C-206A-41CE-CD937A8C9107}"/>
+                <a16:creationId xmlns:a16="http://schemas.microsoft.com/office/drawing/2014/main" id="{A907B655-ADC6-0DB3-D40C-B4A4F02C56AD}"/>
               </a:ext>
             </a:extLst>
           </p:cNvPr>
@@ -16818,6 +16873,853 @@
           <a:bodyPr/>
           <a:lstStyle/>
           <a:p>
+            <a:r>
+              <a:rPr lang="en-IN"/>
+              <a:t>Sample functions in modules</a:t>
+            </a:r>
+          </a:p>
+        </p:txBody>
+      </p:sp>
+      <mc:AlternateContent xmlns:mc="http://schemas.openxmlformats.org/markup-compatibility/2006">
+        <mc:Choice xmlns:a14="http://schemas.microsoft.com/office/drawing/2010/main" Requires="a14">
+          <p:sp>
+            <p:nvSpPr>
+              <p:cNvPr id="3" name="Content Placeholder 2">
+                <a:extLst>
+                  <a:ext uri="{FF2B5EF4-FFF2-40B4-BE49-F238E27FC236}">
+                    <a16:creationId xmlns:a16="http://schemas.microsoft.com/office/drawing/2014/main" id="{B248B06E-0246-4FEF-533A-B0C46C596083}"/>
+                  </a:ext>
+                </a:extLst>
+              </p:cNvPr>
+              <p:cNvSpPr>
+                <a:spLocks noGrp="1"/>
+              </p:cNvSpPr>
+              <p:nvPr>
+                <p:ph idx="1"/>
+              </p:nvPr>
+            </p:nvSpPr>
+            <p:spPr/>
+            <p:txBody>
+              <a:bodyPr>
+                <a:normAutofit/>
+              </a:bodyPr>
+              <a:lstStyle/>
+              <a:p>
+                <a:r>
+                  <a:rPr lang="en-IN" b="1" dirty="0">
+                    <a:solidFill>
+                      <a:srgbClr val="9558B2"/>
+                    </a:solidFill>
+                  </a:rPr>
+                  <a:t>P5: </a:t>
+                </a:r>
+                <a:r>
+                  <a:rPr lang="en-IN" b="1" dirty="0" err="1">
+                    <a:solidFill>
+                      <a:srgbClr val="9558B2"/>
+                    </a:solidFill>
+                  </a:rPr>
+                  <a:t>NKGSmallSignalStability</a:t>
+                </a:r>
+                <a:endParaRPr lang="en-IN" b="1" dirty="0">
+                  <a:solidFill>
+                    <a:srgbClr val="9558B2"/>
+                  </a:solidFill>
+                </a:endParaRPr>
+              </a:p>
+              <a:p>
+                <a:r>
+                  <a:rPr lang="en-IN" dirty="0"/>
+                  <a:t>Dependencies:</a:t>
+                </a:r>
+                <a:r>
+                  <a:rPr lang="en-IN" b="1" dirty="0">
+                    <a:solidFill>
+                      <a:schemeClr val="accent2">
+                        <a:lumMod val="75000"/>
+                      </a:schemeClr>
+                    </a:solidFill>
+                  </a:rPr>
+                  <a:t> </a:t>
+                </a:r>
+                <a:r>
+                  <a:rPr lang="en-IN" b="1" dirty="0" err="1">
+                    <a:solidFill>
+                      <a:srgbClr val="002060"/>
+                    </a:solidFill>
+                  </a:rPr>
+                  <a:t>NKGPowerFlow</a:t>
+                </a:r>
+                <a:r>
+                  <a:rPr lang="en-IN" dirty="0"/>
+                  <a:t>: </a:t>
+                </a:r>
+                <a:r>
+                  <a:rPr lang="en-IN" i="1" dirty="0" err="1"/>
+                  <a:t>initializeVectors</a:t>
+                </a:r>
+                <a:r>
+                  <a:rPr lang="en-IN" dirty="0"/>
+                  <a:t>,</a:t>
+                </a:r>
+                <a:r>
+                  <a:rPr lang="en-IN" i="1" dirty="0"/>
+                  <a:t> </a:t>
+                </a:r>
+                <a:r>
+                  <a:rPr lang="en-IN" i="1" dirty="0" err="1"/>
+                  <a:t>solveForPowerFlow</a:t>
+                </a:r>
+                <a:endParaRPr lang="en-IN" dirty="0"/>
+              </a:p>
+              <a:p>
+                <a:r>
+                  <a:rPr lang="en-IN" dirty="0"/>
+                  <a:t>Suggested functions: </a:t>
+                </a:r>
+                <a:r>
+                  <a:rPr lang="en-IN" sz="2000" dirty="0" err="1"/>
+                  <a:t>generateEquilibriumEquations</a:t>
+                </a:r>
+                <a14:m>
+                  <m:oMath xmlns:m="http://schemas.openxmlformats.org/officeDocument/2006/math">
+                    <m:r>
+                      <a:rPr lang="en-US" sz="2000" b="0" i="0" smtClean="0">
+                        <a:latin typeface="Cambria Math" panose="02040503050406030204" pitchFamily="18" charset="0"/>
+                      </a:rPr>
+                      <m:t>(</m:t>
+                    </m:r>
+                    <m:r>
+                      <m:rPr>
+                        <m:sty m:val="p"/>
+                      </m:rPr>
+                      <a:rPr lang="en-US" sz="2000" b="0" i="0" smtClean="0">
+                        <a:latin typeface="Cambria Math" panose="02040503050406030204" pitchFamily="18" charset="0"/>
+                      </a:rPr>
+                      <m:t>b</m:t>
+                    </m:r>
+                    <m:r>
+                      <a:rPr lang="en-US" sz="2000" b="0" i="1" smtClean="0">
+                        <a:latin typeface="Cambria Math" panose="02040503050406030204" pitchFamily="18" charset="0"/>
+                      </a:rPr>
+                      <m:t>𝑢𝑠𝐷𝑎𝑡𝑎</m:t>
+                    </m:r>
+                    <m:r>
+                      <a:rPr lang="en-US" sz="2000" b="0" i="1" smtClean="0">
+                        <a:latin typeface="Cambria Math" panose="02040503050406030204" pitchFamily="18" charset="0"/>
+                      </a:rPr>
+                      <m:t>, </m:t>
+                    </m:r>
+                    <m:r>
+                      <a:rPr lang="en-US" sz="2000" b="0" i="1" smtClean="0">
+                        <a:latin typeface="Cambria Math" panose="02040503050406030204" pitchFamily="18" charset="0"/>
+                      </a:rPr>
+                      <m:t>𝑏𝑟𝑎𝑛𝑐h𝐷𝑎𝑡𝑎</m:t>
+                    </m:r>
+                    <m:r>
+                      <a:rPr lang="en-US" sz="2000" b="0" i="1" smtClean="0">
+                        <a:latin typeface="Cambria Math" panose="02040503050406030204" pitchFamily="18" charset="0"/>
+                      </a:rPr>
+                      <m:t>, </m:t>
+                    </m:r>
+                    <m:r>
+                      <a:rPr lang="en-US" sz="2000" b="0" i="1" smtClean="0">
+                        <a:latin typeface="Cambria Math" panose="02040503050406030204" pitchFamily="18" charset="0"/>
+                      </a:rPr>
+                      <m:t>𝑟𝑒𝑠𝑢𝑙𝑡𝐷𝑎𝑡𝑎</m:t>
+                    </m:r>
+                    <m:r>
+                      <a:rPr lang="en-US" sz="2000" b="0" i="1" smtClean="0">
+                        <a:latin typeface="Cambria Math" panose="02040503050406030204" pitchFamily="18" charset="0"/>
+                      </a:rPr>
+                      <m:t>, </m:t>
+                    </m:r>
+                    <m:r>
+                      <a:rPr lang="en-US" sz="2000" b="0" i="1" smtClean="0">
+                        <a:latin typeface="Cambria Math" panose="02040503050406030204" pitchFamily="18" charset="0"/>
+                      </a:rPr>
+                      <m:t>𝑚𝑜𝑑𝑒𝑙𝑇𝑦𝑝𝑒</m:t>
+                    </m:r>
+                    <m:r>
+                      <a:rPr lang="en-US" sz="2000" b="0" i="1" smtClean="0">
+                        <a:latin typeface="Cambria Math" panose="02040503050406030204" pitchFamily="18" charset="0"/>
+                      </a:rPr>
+                      <m:t>)</m:t>
+                    </m:r>
+                  </m:oMath>
+                </a14:m>
+                <a:endParaRPr lang="en-IN" sz="2000" dirty="0"/>
+              </a:p>
+              <a:p>
+                <a:pPr marL="0" indent="0">
+                  <a:buNone/>
+                </a:pPr>
+                <a:r>
+                  <a:rPr lang="en-IN" sz="2000" dirty="0"/>
+                  <a:t>    </a:t>
+                </a:r>
+                <a:r>
+                  <a:rPr lang="en-IN" sz="2000" dirty="0" err="1"/>
+                  <a:t>generateSmallSignalStabilityEquations</a:t>
+                </a:r>
+                <a14:m>
+                  <m:oMath xmlns:m="http://schemas.openxmlformats.org/officeDocument/2006/math">
+                    <m:r>
+                      <a:rPr lang="en-US" sz="2000" b="0" i="0" smtClean="0">
+                        <a:latin typeface="Cambria Math" panose="02040503050406030204" pitchFamily="18" charset="0"/>
+                      </a:rPr>
+                      <m:t>(</m:t>
+                    </m:r>
+                    <m:r>
+                      <m:rPr>
+                        <m:sty m:val="p"/>
+                      </m:rPr>
+                      <a:rPr lang="en-US" sz="2000" b="0" i="0" smtClean="0">
+                        <a:latin typeface="Cambria Math" panose="02040503050406030204" pitchFamily="18" charset="0"/>
+                      </a:rPr>
+                      <m:t>b</m:t>
+                    </m:r>
+                    <m:r>
+                      <a:rPr lang="en-US" sz="2000" b="0" i="1" smtClean="0">
+                        <a:latin typeface="Cambria Math" panose="02040503050406030204" pitchFamily="18" charset="0"/>
+                      </a:rPr>
+                      <m:t>𝑢𝑠𝐷𝑎𝑡𝑎</m:t>
+                    </m:r>
+                    <m:r>
+                      <a:rPr lang="en-US" sz="2000" b="0" i="1" smtClean="0">
+                        <a:latin typeface="Cambria Math" panose="02040503050406030204" pitchFamily="18" charset="0"/>
+                      </a:rPr>
+                      <m:t>, </m:t>
+                    </m:r>
+                    <m:r>
+                      <a:rPr lang="en-US" sz="2000" b="0" i="1" smtClean="0">
+                        <a:latin typeface="Cambria Math" panose="02040503050406030204" pitchFamily="18" charset="0"/>
+                      </a:rPr>
+                      <m:t>𝑏𝑟𝑎𝑛𝑐h𝐷𝑎𝑡𝑎</m:t>
+                    </m:r>
+                    <m:r>
+                      <a:rPr lang="en-US" sz="2000" b="0" i="1" smtClean="0">
+                        <a:latin typeface="Cambria Math" panose="02040503050406030204" pitchFamily="18" charset="0"/>
+                      </a:rPr>
+                      <m:t>, </m:t>
+                    </m:r>
+                    <m:r>
+                      <a:rPr lang="en-US" sz="2000" b="0" i="1" smtClean="0">
+                        <a:latin typeface="Cambria Math" panose="02040503050406030204" pitchFamily="18" charset="0"/>
+                      </a:rPr>
+                      <m:t>𝑟𝑒𝑠𝑢𝑙𝑡𝐷𝑎𝑡𝑎</m:t>
+                    </m:r>
+                    <m:r>
+                      <a:rPr lang="en-US" sz="2000" b="0" i="1" smtClean="0">
+                        <a:latin typeface="Cambria Math" panose="02040503050406030204" pitchFamily="18" charset="0"/>
+                      </a:rPr>
+                      <m:t>, </m:t>
+                    </m:r>
+                    <m:r>
+                      <a:rPr lang="en-US" sz="2000" b="0" i="1" smtClean="0">
+                        <a:latin typeface="Cambria Math" panose="02040503050406030204" pitchFamily="18" charset="0"/>
+                      </a:rPr>
+                      <m:t>𝑚𝑜𝑑𝑒𝑙𝑇𝑦𝑝𝑒</m:t>
+                    </m:r>
+                    <m:r>
+                      <a:rPr lang="en-US" sz="2000" b="0" i="1" smtClean="0">
+                        <a:latin typeface="Cambria Math" panose="02040503050406030204" pitchFamily="18" charset="0"/>
+                      </a:rPr>
+                      <m:t>)</m:t>
+                    </m:r>
+                  </m:oMath>
+                </a14:m>
+                <a:endParaRPr lang="en-IN" sz="2000" dirty="0"/>
+              </a:p>
+              <a:p>
+                <a14:m>
+                  <m:oMath xmlns:m="http://schemas.openxmlformats.org/officeDocument/2006/math">
+                    <m:sSub>
+                      <m:sSubPr>
+                        <m:ctrlPr>
+                          <a:rPr lang="en-US" sz="2000" b="0" i="1" smtClean="0">
+                            <a:latin typeface="Cambria Math" panose="02040503050406030204" pitchFamily="18" charset="0"/>
+                          </a:rPr>
+                        </m:ctrlPr>
+                      </m:sSubPr>
+                      <m:e>
+                        <m:r>
+                          <a:rPr lang="en-US" sz="2000" b="0" i="1" smtClean="0">
+                            <a:latin typeface="Cambria Math" panose="02040503050406030204" pitchFamily="18" charset="0"/>
+                          </a:rPr>
+                          <m:t>𝑌</m:t>
+                        </m:r>
+                      </m:e>
+                      <m:sub>
+                        <m:r>
+                          <a:rPr lang="en-US" sz="2000" b="0" i="1" smtClean="0">
+                            <a:latin typeface="Cambria Math" panose="02040503050406030204" pitchFamily="18" charset="0"/>
+                          </a:rPr>
+                          <m:t>𝐺𝑒𝑛</m:t>
+                        </m:r>
+                      </m:sub>
+                    </m:sSub>
+                    <m:r>
+                      <a:rPr lang="en-US" sz="2000" b="0" i="1" smtClean="0">
+                        <a:latin typeface="Cambria Math" panose="02040503050406030204" pitchFamily="18" charset="0"/>
+                      </a:rPr>
+                      <m:t>= </m:t>
+                    </m:r>
+                  </m:oMath>
+                </a14:m>
+                <a:r>
+                  <a:rPr lang="en-IN" sz="2000" i="1" dirty="0" err="1"/>
+                  <a:t>generateYGen</a:t>
+                </a:r>
+                <a14:m>
+                  <m:oMath xmlns:m="http://schemas.openxmlformats.org/officeDocument/2006/math">
+                    <m:d>
+                      <m:dPr>
+                        <m:ctrlPr>
+                          <a:rPr lang="en-US" sz="2000" b="0" i="1" smtClean="0">
+                            <a:latin typeface="Cambria Math" panose="02040503050406030204" pitchFamily="18" charset="0"/>
+                          </a:rPr>
+                        </m:ctrlPr>
+                      </m:dPr>
+                      <m:e>
+                        <m:r>
+                          <a:rPr lang="en-US" sz="2000" b="0" i="1" smtClean="0">
+                            <a:latin typeface="Cambria Math" panose="02040503050406030204" pitchFamily="18" charset="0"/>
+                          </a:rPr>
+                          <m:t>𝑏𝑢𝑠𝐷𝑎𝑡𝑎</m:t>
+                        </m:r>
+                        <m:r>
+                          <a:rPr lang="en-US" sz="2000" b="0" i="1" smtClean="0">
+                            <a:latin typeface="Cambria Math" panose="02040503050406030204" pitchFamily="18" charset="0"/>
+                          </a:rPr>
+                          <m:t>, </m:t>
+                        </m:r>
+                        <m:r>
+                          <a:rPr lang="en-US" sz="2000" b="0" i="1" smtClean="0">
+                            <a:latin typeface="Cambria Math" panose="02040503050406030204" pitchFamily="18" charset="0"/>
+                          </a:rPr>
+                          <m:t>𝑏𝑟𝑎𝑛𝑐h𝐷𝑎𝑡𝑎</m:t>
+                        </m:r>
+                      </m:e>
+                    </m:d>
+                  </m:oMath>
+                </a14:m>
+                <a:endParaRPr lang="en-US" sz="2000" b="0" i="1" dirty="0"/>
+              </a:p>
+              <a:p>
+                <a:pPr lvl="1"/>
+                <a:r>
+                  <a:rPr lang="en-US" sz="1600" b="0" dirty="0"/>
+                  <a:t>[</a:t>
+                </a:r>
+                <a14:m>
+                  <m:oMath xmlns:m="http://schemas.openxmlformats.org/officeDocument/2006/math">
+                    <m:r>
+                      <a:rPr lang="en-US" sz="1600" b="0" i="1" smtClean="0">
+                        <a:latin typeface="Cambria Math" panose="02040503050406030204" pitchFamily="18" charset="0"/>
+                      </a:rPr>
+                      <m:t>𝑏𝑢𝑠𝐷𝑎𝑡𝑎𝑀𝑜𝑑𝑖𝑓𝑖𝑒𝑑</m:t>
+                    </m:r>
+                    <m:r>
+                      <a:rPr lang="en-US" sz="1600" b="0" i="1" smtClean="0">
+                        <a:latin typeface="Cambria Math" panose="02040503050406030204" pitchFamily="18" charset="0"/>
+                      </a:rPr>
+                      <m:t>, </m:t>
+                    </m:r>
+                    <m:r>
+                      <a:rPr lang="en-US" sz="1600" b="0" i="1" smtClean="0">
+                        <a:latin typeface="Cambria Math" panose="02040503050406030204" pitchFamily="18" charset="0"/>
+                      </a:rPr>
+                      <m:t>𝑏𝑟𝑎𝑛𝑐h𝐷𝑎𝑡𝑎𝑀𝑜𝑑𝑖𝑓𝑖𝑒𝑑</m:t>
+                    </m:r>
+                    <m:r>
+                      <a:rPr lang="en-US" sz="1600" b="0" i="1" smtClean="0">
+                        <a:latin typeface="Cambria Math" panose="02040503050406030204" pitchFamily="18" charset="0"/>
+                      </a:rPr>
+                      <m:t>]= </m:t>
+                    </m:r>
+                  </m:oMath>
+                </a14:m>
+                <a:r>
+                  <a:rPr lang="en-IN" sz="1600" i="1" dirty="0" err="1"/>
+                  <a:t>modifyForYNet</a:t>
+                </a:r>
+                <a:r>
+                  <a:rPr lang="en-IN" sz="1600" i="1" dirty="0"/>
+                  <a:t>(</a:t>
+                </a:r>
+                <a14:m>
+                  <m:oMath xmlns:m="http://schemas.openxmlformats.org/officeDocument/2006/math">
+                    <m:r>
+                      <a:rPr lang="en-US" sz="1600" b="0" i="1" smtClean="0">
+                        <a:latin typeface="Cambria Math" panose="02040503050406030204" pitchFamily="18" charset="0"/>
+                      </a:rPr>
+                      <m:t>𝑏𝑢𝑠𝐷𝑎𝑡𝑎</m:t>
+                    </m:r>
+                    <m:r>
+                      <a:rPr lang="en-US" sz="1600" b="0" i="1" smtClean="0">
+                        <a:latin typeface="Cambria Math" panose="02040503050406030204" pitchFamily="18" charset="0"/>
+                      </a:rPr>
+                      <m:t>, </m:t>
+                    </m:r>
+                    <m:r>
+                      <a:rPr lang="en-US" sz="1600" b="0" i="1" smtClean="0">
+                        <a:latin typeface="Cambria Math" panose="02040503050406030204" pitchFamily="18" charset="0"/>
+                      </a:rPr>
+                      <m:t>𝑏𝑟𝑎𝑛𝑐h𝐷𝑎𝑡𝑎</m:t>
+                    </m:r>
+                  </m:oMath>
+                </a14:m>
+                <a:r>
+                  <a:rPr lang="en-IN" sz="1600" dirty="0"/>
+                  <a:t>)</a:t>
+                </a:r>
+              </a:p>
+              <a:p>
+                <a:pPr lvl="1"/>
+                <a14:m>
+                  <m:oMath xmlns:m="http://schemas.openxmlformats.org/officeDocument/2006/math">
+                    <m:sSub>
+                      <m:sSubPr>
+                        <m:ctrlPr>
+                          <a:rPr lang="en-US" sz="1600" b="0" i="1" smtClean="0">
+                            <a:latin typeface="Cambria Math" panose="02040503050406030204" pitchFamily="18" charset="0"/>
+                          </a:rPr>
+                        </m:ctrlPr>
+                      </m:sSubPr>
+                      <m:e>
+                        <m:r>
+                          <a:rPr lang="en-US" sz="1600" b="0" i="1" smtClean="0">
+                            <a:latin typeface="Cambria Math" panose="02040503050406030204" pitchFamily="18" charset="0"/>
+                          </a:rPr>
+                          <m:t>𝑌</m:t>
+                        </m:r>
+                      </m:e>
+                      <m:sub>
+                        <m:r>
+                          <a:rPr lang="en-US" sz="1600" b="0" i="1" smtClean="0">
+                            <a:latin typeface="Cambria Math" panose="02040503050406030204" pitchFamily="18" charset="0"/>
+                          </a:rPr>
+                          <m:t>𝑁𝑒𝑡</m:t>
+                        </m:r>
+                      </m:sub>
+                    </m:sSub>
+                  </m:oMath>
+                </a14:m>
+                <a:r>
+                  <a:rPr lang="en-IN" sz="1600" dirty="0"/>
+                  <a:t> = </a:t>
+                </a:r>
+                <a14:m>
+                  <m:oMath xmlns:m="http://schemas.openxmlformats.org/officeDocument/2006/math">
+                    <m:r>
+                      <a:rPr lang="en-US" sz="1600" b="0" i="1" smtClean="0">
+                        <a:latin typeface="Cambria Math" panose="02040503050406030204" pitchFamily="18" charset="0"/>
+                      </a:rPr>
+                      <m:t>𝑔𝑒𝑛𝑒𝑟𝑎𝑡𝑒𝑌𝐵𝑢𝑠</m:t>
+                    </m:r>
+                    <m:r>
+                      <a:rPr lang="en-US" sz="1600" b="0" i="1" smtClean="0">
+                        <a:latin typeface="Cambria Math" panose="02040503050406030204" pitchFamily="18" charset="0"/>
+                      </a:rPr>
+                      <m:t>(</m:t>
+                    </m:r>
+                    <m:r>
+                      <m:rPr>
+                        <m:nor/>
+                      </m:rPr>
+                      <a:rPr lang="en-US" sz="1600" dirty="0"/>
+                      <m:t>[</m:t>
+                    </m:r>
+                    <m:r>
+                      <a:rPr lang="en-US" sz="1600" i="1">
+                        <a:latin typeface="Cambria Math" panose="02040503050406030204" pitchFamily="18" charset="0"/>
+                      </a:rPr>
+                      <m:t>𝑏𝑢𝑠𝐷𝑎𝑡𝑎𝑀𝑜𝑑𝑖𝑓𝑖𝑒𝑑</m:t>
+                    </m:r>
+                    <m:r>
+                      <a:rPr lang="en-US" sz="1600" i="1">
+                        <a:latin typeface="Cambria Math" panose="02040503050406030204" pitchFamily="18" charset="0"/>
+                      </a:rPr>
+                      <m:t>, </m:t>
+                    </m:r>
+                    <m:r>
+                      <a:rPr lang="en-US" sz="1600" i="1">
+                        <a:latin typeface="Cambria Math" panose="02040503050406030204" pitchFamily="18" charset="0"/>
+                      </a:rPr>
+                      <m:t>𝑏𝑟𝑎𝑛𝑐h𝐷𝑎𝑡𝑎𝑀𝑜𝑑𝑖𝑓𝑖𝑒𝑑</m:t>
+                    </m:r>
+                    <m:r>
+                      <a:rPr lang="en-US" sz="1600" i="1">
+                        <a:latin typeface="Cambria Math" panose="02040503050406030204" pitchFamily="18" charset="0"/>
+                      </a:rPr>
+                      <m:t>]</m:t>
+                    </m:r>
+                  </m:oMath>
+                </a14:m>
+                <a:r>
+                  <a:rPr lang="en-IN" sz="1600" dirty="0"/>
+                  <a:t>)</a:t>
+                </a:r>
+              </a:p>
+              <a:p>
+                <a:pPr lvl="1"/>
+                <a14:m>
+                  <m:oMath xmlns:m="http://schemas.openxmlformats.org/officeDocument/2006/math">
+                    <m:sSub>
+                      <m:sSubPr>
+                        <m:ctrlPr>
+                          <a:rPr lang="en-US" sz="1600" b="0" i="1" smtClean="0">
+                            <a:latin typeface="Cambria Math" panose="02040503050406030204" pitchFamily="18" charset="0"/>
+                          </a:rPr>
+                        </m:ctrlPr>
+                      </m:sSubPr>
+                      <m:e>
+                        <m:r>
+                          <a:rPr lang="en-US" sz="1600" b="0" i="1" smtClean="0">
+                            <a:latin typeface="Cambria Math" panose="02040503050406030204" pitchFamily="18" charset="0"/>
+                          </a:rPr>
+                          <m:t>𝑌</m:t>
+                        </m:r>
+                      </m:e>
+                      <m:sub>
+                        <m:r>
+                          <a:rPr lang="en-US" sz="1600" b="0" i="1" smtClean="0">
+                            <a:latin typeface="Cambria Math" panose="02040503050406030204" pitchFamily="18" charset="0"/>
+                          </a:rPr>
+                          <m:t>𝐺𝑒𝑛</m:t>
+                        </m:r>
+                      </m:sub>
+                    </m:sSub>
+                    <m:r>
+                      <a:rPr lang="en-US" sz="1600" b="0" i="1" smtClean="0">
+                        <a:latin typeface="Cambria Math" panose="02040503050406030204" pitchFamily="18" charset="0"/>
+                      </a:rPr>
+                      <m:t>= </m:t>
+                    </m:r>
+                  </m:oMath>
+                </a14:m>
+                <a:r>
+                  <a:rPr lang="en-IN" sz="1600" dirty="0" err="1"/>
+                  <a:t>constructYGen</a:t>
+                </a:r>
+                <a:r>
+                  <a:rPr lang="en-IN" sz="1600" dirty="0"/>
+                  <a:t>(</a:t>
+                </a:r>
+                <a14:m>
+                  <m:oMath xmlns:m="http://schemas.openxmlformats.org/officeDocument/2006/math">
+                    <m:sSub>
+                      <m:sSubPr>
+                        <m:ctrlPr>
+                          <a:rPr lang="en-US" sz="1600" b="0" i="1" smtClean="0">
+                            <a:latin typeface="Cambria Math" panose="02040503050406030204" pitchFamily="18" charset="0"/>
+                          </a:rPr>
+                        </m:ctrlPr>
+                      </m:sSubPr>
+                      <m:e>
+                        <m:r>
+                          <a:rPr lang="en-US" sz="1600" b="0" i="1" smtClean="0">
+                            <a:latin typeface="Cambria Math" panose="02040503050406030204" pitchFamily="18" charset="0"/>
+                          </a:rPr>
+                          <m:t>𝑌</m:t>
+                        </m:r>
+                      </m:e>
+                      <m:sub>
+                        <m:r>
+                          <a:rPr lang="en-US" sz="1600" b="0" i="1" smtClean="0">
+                            <a:latin typeface="Cambria Math" panose="02040503050406030204" pitchFamily="18" charset="0"/>
+                          </a:rPr>
+                          <m:t>𝑁𝑒𝑡</m:t>
+                        </m:r>
+                      </m:sub>
+                    </m:sSub>
+                    <m:r>
+                      <a:rPr lang="en-US" sz="1600" b="0" i="1" smtClean="0">
+                        <a:latin typeface="Cambria Math" panose="02040503050406030204" pitchFamily="18" charset="0"/>
+                      </a:rPr>
+                      <m:t>)</m:t>
+                    </m:r>
+                  </m:oMath>
+                </a14:m>
+                <a:endParaRPr lang="en-IN" sz="1600" dirty="0"/>
+              </a:p>
+              <a:p>
+                <a:r>
+                  <a:rPr lang="en-IN" sz="2000" i="1" dirty="0" err="1"/>
+                  <a:t>solveForOPF</a:t>
+                </a:r>
+                <a:r>
+                  <a:rPr lang="en-IN" sz="2000" i="1" dirty="0"/>
+                  <a:t> </a:t>
+                </a:r>
+                <a:r>
+                  <a:rPr lang="en-IN" sz="2000" dirty="0"/>
+                  <a:t>for the next two scenarios</a:t>
+                </a:r>
+              </a:p>
+              <a:p>
+                <a:pPr lvl="1"/>
+                <a:r>
+                  <a:rPr lang="en-IN" sz="1800" i="1" dirty="0" err="1"/>
+                  <a:t>generateSymoblicPowerFlowEquations</a:t>
+                </a:r>
+                <a:endParaRPr lang="en-IN" sz="1800" i="1" dirty="0"/>
+              </a:p>
+              <a:p>
+                <a:endParaRPr lang="en-IN" i="1" dirty="0"/>
+              </a:p>
+              <a:p>
+                <a:endParaRPr lang="en-IN" i="1" dirty="0"/>
+              </a:p>
+            </p:txBody>
+          </p:sp>
+        </mc:Choice>
+        <mc:Fallback>
+          <p:sp>
+            <p:nvSpPr>
+              <p:cNvPr id="3" name="Content Placeholder 2">
+                <a:extLst>
+                  <a:ext uri="{FF2B5EF4-FFF2-40B4-BE49-F238E27FC236}">
+                    <a16:creationId xmlns:a16="http://schemas.microsoft.com/office/drawing/2014/main" id="{B248B06E-0246-4FEF-533A-B0C46C596083}"/>
+                  </a:ext>
+                </a:extLst>
+              </p:cNvPr>
+              <p:cNvSpPr>
+                <a:spLocks noGrp="1" noRot="1" noChangeAspect="1" noMove="1" noResize="1" noEditPoints="1" noAdjustHandles="1" noChangeArrowheads="1" noChangeShapeType="1" noTextEdit="1"/>
+              </p:cNvSpPr>
+              <p:nvPr>
+                <p:ph idx="1"/>
+              </p:nvPr>
+            </p:nvSpPr>
+            <p:spPr>
+              <a:blipFill>
+                <a:blip r:embed="rId2"/>
+                <a:stretch>
+                  <a:fillRect l="-1043" t="-2241"/>
+                </a:stretch>
+              </a:blipFill>
+            </p:spPr>
+            <p:txBody>
+              <a:bodyPr/>
+              <a:lstStyle/>
+              <a:p>
+                <a:r>
+                  <a:rPr lang="en-US">
+                    <a:noFill/>
+                  </a:rPr>
+                  <a:t> </a:t>
+                </a:r>
+              </a:p>
+            </p:txBody>
+          </p:sp>
+        </mc:Fallback>
+      </mc:AlternateContent>
+    </p:spTree>
+    <p:extLst>
+      <p:ext uri="{BB962C8B-B14F-4D97-AF65-F5344CB8AC3E}">
+        <p14:creationId xmlns:p14="http://schemas.microsoft.com/office/powerpoint/2010/main" val="928494366"/>
+      </p:ext>
+    </p:extLst>
+  </p:cSld>
+  <p:clrMapOvr>
+    <a:masterClrMapping/>
+  </p:clrMapOvr>
+</p:sld>
+</file>
+
+<file path=ppt/slides/slide37.xml><?xml version="1.0" encoding="utf-8"?>
+<p:sld xmlns:a="http://schemas.openxmlformats.org/drawingml/2006/main" xmlns:r="http://schemas.openxmlformats.org/officeDocument/2006/relationships" xmlns:p="http://schemas.openxmlformats.org/presentationml/2006/main">
+  <p:cSld>
+    <p:spTree>
+      <p:nvGrpSpPr>
+        <p:cNvPr id="1" name=""/>
+        <p:cNvGrpSpPr/>
+        <p:nvPr/>
+      </p:nvGrpSpPr>
+      <p:grpSpPr>
+        <a:xfrm>
+          <a:off x="0" y="0"/>
+          <a:ext cx="0" cy="0"/>
+          <a:chOff x="0" y="0"/>
+          <a:chExt cx="0" cy="0"/>
+        </a:xfrm>
+      </p:grpSpPr>
+      <p:sp>
+        <p:nvSpPr>
+          <p:cNvPr id="2" name="Title 1">
+            <a:extLst>
+              <a:ext uri="{FF2B5EF4-FFF2-40B4-BE49-F238E27FC236}">
+                <a16:creationId xmlns:a16="http://schemas.microsoft.com/office/drawing/2014/main" id="{A6356650-F690-31BC-E5AD-5EA5C723EE0C}"/>
+              </a:ext>
+            </a:extLst>
+          </p:cNvPr>
+          <p:cNvSpPr>
+            <a:spLocks noGrp="1"/>
+          </p:cNvSpPr>
+          <p:nvPr>
+            <p:ph type="title"/>
+          </p:nvPr>
+        </p:nvSpPr>
+        <p:spPr/>
+        <p:txBody>
+          <a:bodyPr/>
+          <a:lstStyle/>
+          <a:p>
+            <a:r>
+              <a:rPr lang="en-US" dirty="0"/>
+              <a:t>Goal X: Show Mani </a:t>
+            </a:r>
+            <a:r>
+              <a:rPr lang="en-US" dirty="0">
+                <a:solidFill>
+                  <a:srgbClr val="9558B2"/>
+                </a:solidFill>
+              </a:rPr>
+              <a:t>P6</a:t>
+            </a:r>
+            <a:r>
+              <a:rPr lang="en-US" dirty="0"/>
+              <a:t> and P7</a:t>
+            </a:r>
+          </a:p>
+        </p:txBody>
+      </p:sp>
+      <p:sp>
+        <p:nvSpPr>
+          <p:cNvPr id="3" name="Content Placeholder 2">
+            <a:extLst>
+              <a:ext uri="{FF2B5EF4-FFF2-40B4-BE49-F238E27FC236}">
+                <a16:creationId xmlns:a16="http://schemas.microsoft.com/office/drawing/2014/main" id="{19EAD700-9CB1-1ED7-248D-4D43669823A8}"/>
+              </a:ext>
+            </a:extLst>
+          </p:cNvPr>
+          <p:cNvSpPr>
+            <a:spLocks noGrp="1"/>
+          </p:cNvSpPr>
+          <p:nvPr>
+            <p:ph idx="1"/>
+          </p:nvPr>
+        </p:nvSpPr>
+        <p:spPr/>
+        <p:txBody>
+          <a:bodyPr/>
+          <a:lstStyle/>
+          <a:p>
+            <a:r>
+              <a:rPr lang="en-US" dirty="0"/>
+              <a:t>Required steps: </a:t>
+            </a:r>
+          </a:p>
+          <a:p>
+            <a:pPr marL="914400" lvl="1" indent="-457200">
+              <a:buFont typeface="+mj-lt"/>
+              <a:buAutoNum type="arabicPeriod"/>
+            </a:pPr>
+            <a:r>
+              <a:rPr lang="en-US" dirty="0"/>
+              <a:t>Dynamic Initialization (</a:t>
+            </a:r>
+            <a:r>
+              <a:rPr lang="en-US" dirty="0" err="1"/>
+              <a:t>DynInit</a:t>
+            </a:r>
+            <a:r>
+              <a:rPr lang="en-US" dirty="0"/>
+              <a:t>)</a:t>
+            </a:r>
+          </a:p>
+          <a:p>
+            <a:pPr marL="914400" lvl="1" indent="-457200">
+              <a:buFont typeface="+mj-lt"/>
+              <a:buAutoNum type="arabicPeriod"/>
+            </a:pPr>
+            <a:r>
+              <a:rPr lang="en-US" dirty="0">
+                <a:solidFill>
+                  <a:srgbClr val="9558B2"/>
+                </a:solidFill>
+              </a:rPr>
+              <a:t>Small-Signal Stability Analysis (SSSA) P6</a:t>
+            </a:r>
+          </a:p>
+          <a:p>
+            <a:pPr marL="914400" lvl="1" indent="-457200">
+              <a:buFont typeface="+mj-lt"/>
+              <a:buAutoNum type="arabicPeriod"/>
+            </a:pPr>
+            <a:r>
+              <a:rPr lang="en-US" dirty="0"/>
+              <a:t>Transient Stability Analysis (TSA) P7</a:t>
+            </a:r>
+          </a:p>
+          <a:p>
+            <a:r>
+              <a:rPr lang="en-US" dirty="0"/>
+              <a:t>Sub-goal: Get Type 3 aka Classical Model for ieee11 to for all three steps. Implement Type 2 and Type 1 for </a:t>
+            </a:r>
+            <a:r>
+              <a:rPr lang="en-US" dirty="0">
+                <a:solidFill>
+                  <a:srgbClr val="9558B2"/>
+                </a:solidFill>
+              </a:rPr>
+              <a:t>P6</a:t>
+            </a:r>
+          </a:p>
+        </p:txBody>
+      </p:sp>
+    </p:spTree>
+    <p:extLst>
+      <p:ext uri="{BB962C8B-B14F-4D97-AF65-F5344CB8AC3E}">
+        <p14:creationId xmlns:p14="http://schemas.microsoft.com/office/powerpoint/2010/main" val="753531470"/>
+      </p:ext>
+    </p:extLst>
+  </p:cSld>
+  <p:clrMapOvr>
+    <a:masterClrMapping/>
+  </p:clrMapOvr>
+</p:sld>
+</file>
+
+<file path=ppt/slides/slide38.xml><?xml version="1.0" encoding="utf-8"?>
+<p:sld xmlns:a="http://schemas.openxmlformats.org/drawingml/2006/main" xmlns:r="http://schemas.openxmlformats.org/officeDocument/2006/relationships" xmlns:p="http://schemas.openxmlformats.org/presentationml/2006/main">
+  <p:cSld>
+    <p:spTree>
+      <p:nvGrpSpPr>
+        <p:cNvPr id="1" name=""/>
+        <p:cNvGrpSpPr/>
+        <p:nvPr/>
+      </p:nvGrpSpPr>
+      <p:grpSpPr>
+        <a:xfrm>
+          <a:off x="0" y="0"/>
+          <a:ext cx="0" cy="0"/>
+          <a:chOff x="0" y="0"/>
+          <a:chExt cx="0" cy="0"/>
+        </a:xfrm>
+      </p:grpSpPr>
+      <p:sp>
+        <p:nvSpPr>
+          <p:cNvPr id="2" name="Title 1">
+            <a:extLst>
+              <a:ext uri="{FF2B5EF4-FFF2-40B4-BE49-F238E27FC236}">
+                <a16:creationId xmlns:a16="http://schemas.microsoft.com/office/drawing/2014/main" id="{CB8D80A0-3C5C-206A-41CE-CD937A8C9107}"/>
+              </a:ext>
+            </a:extLst>
+          </p:cNvPr>
+          <p:cNvSpPr>
+            <a:spLocks noGrp="1"/>
+          </p:cNvSpPr>
+          <p:nvPr>
+            <p:ph type="title"/>
+          </p:nvPr>
+        </p:nvSpPr>
+        <p:spPr/>
+        <p:txBody>
+          <a:bodyPr/>
+          <a:lstStyle/>
+          <a:p>
             <a:pPr algn="ctr"/>
             <a:r>
               <a:rPr lang="en-US"/>
@@ -16850,14 +17752,14 @@
             <p:ph idx="1"/>
             <p:extLst>
               <p:ext uri="{D42A27DB-BD31-4B8C-83A1-F6EECF244321}">
-                <p14:modId xmlns:p14="http://schemas.microsoft.com/office/powerpoint/2010/main" val="2144016078"/>
+                <p14:modId xmlns:p14="http://schemas.microsoft.com/office/powerpoint/2010/main" val="2039683992"/>
               </p:ext>
             </p:extLst>
           </p:nvPr>
         </p:nvGraphicFramePr>
         <p:xfrm>
           <a:off x="259308" y="1839273"/>
-          <a:ext cx="11532357" cy="4124960"/>
+          <a:ext cx="11532357" cy="4155440"/>
         </p:xfrm>
         <a:graphic>
           <a:graphicData uri="http://schemas.openxmlformats.org/drawingml/2006/table">
@@ -16916,10 +17818,10 @@
                     <a:lstStyle/>
                     <a:p>
                       <a:r>
-                        <a:rPr lang="en-US"/>
+                        <a:rPr lang="en-US" sz="1600" dirty="0"/>
                         <a:t>Project Number</a:t>
                       </a:r>
-                      <a:endParaRPr lang="en-IN"/>
+                      <a:endParaRPr lang="en-IN" sz="1600" dirty="0"/>
                     </a:p>
                   </a:txBody>
                   <a:tcPr/>
@@ -16930,10 +17832,10 @@
                     <a:lstStyle/>
                     <a:p>
                       <a:r>
-                        <a:rPr lang="en-US"/>
+                        <a:rPr lang="en-US" sz="1600"/>
                         <a:t>Project Name</a:t>
                       </a:r>
-                      <a:endParaRPr lang="en-IN"/>
+                      <a:endParaRPr lang="en-IN" sz="1600"/>
                     </a:p>
                   </a:txBody>
                   <a:tcPr/>
@@ -16944,10 +17846,10 @@
                     <a:lstStyle/>
                     <a:p>
                       <a:r>
-                        <a:rPr lang="en-US"/>
+                        <a:rPr lang="en-US" sz="1600"/>
                         <a:t>Encountered or Perceived Toughness</a:t>
                       </a:r>
-                      <a:endParaRPr lang="en-IN"/>
+                      <a:endParaRPr lang="en-IN" sz="1600"/>
                     </a:p>
                   </a:txBody>
                   <a:tcPr/>
@@ -16958,10 +17860,10 @@
                     <a:lstStyle/>
                     <a:p>
                       <a:r>
-                        <a:rPr lang="en-US"/>
+                        <a:rPr lang="en-US" sz="1600"/>
                         <a:t>Expect Time for Completion [hours]</a:t>
                       </a:r>
-                      <a:endParaRPr lang="en-IN"/>
+                      <a:endParaRPr lang="en-IN" sz="1600"/>
                     </a:p>
                   </a:txBody>
                   <a:tcPr/>
@@ -16972,10 +17874,10 @@
                     <a:lstStyle/>
                     <a:p>
                       <a:r>
-                        <a:rPr lang="en-US"/>
+                        <a:rPr lang="en-US" sz="1200" dirty="0"/>
                         <a:t>Remarks</a:t>
                       </a:r>
-                      <a:endParaRPr lang="en-IN"/>
+                      <a:endParaRPr lang="en-IN" sz="1200" dirty="0"/>
                     </a:p>
                   </a:txBody>
                   <a:tcPr/>
@@ -16986,10 +17888,10 @@
                     <a:lstStyle/>
                     <a:p>
                       <a:r>
-                        <a:rPr lang="en-US"/>
+                        <a:rPr lang="en-US" sz="1600"/>
                         <a:t>Prerequisites</a:t>
                       </a:r>
-                      <a:endParaRPr lang="en-IN"/>
+                      <a:endParaRPr lang="en-IN" sz="1600"/>
                     </a:p>
                   </a:txBody>
                   <a:tcPr/>
@@ -17007,14 +17909,14 @@
                     <a:lstStyle/>
                     <a:p>
                       <a:r>
-                        <a:rPr lang="en-US" b="1">
+                        <a:rPr lang="en-US" sz="1600" b="1">
                           <a:solidFill>
                             <a:srgbClr val="002060"/>
                           </a:solidFill>
                         </a:rPr>
                         <a:t>1</a:t>
                       </a:r>
-                      <a:endParaRPr lang="en-IN" b="1">
+                      <a:endParaRPr lang="en-IN" sz="1600" b="1">
                         <a:solidFill>
                           <a:srgbClr val="002060"/>
                         </a:solidFill>
@@ -17029,14 +17931,14 @@
                     <a:lstStyle/>
                     <a:p>
                       <a:r>
-                        <a:rPr lang="en-US" b="1" err="1">
+                        <a:rPr lang="en-US" sz="1600" b="1" err="1">
                           <a:solidFill>
                             <a:srgbClr val="002060"/>
                           </a:solidFill>
                         </a:rPr>
                         <a:t>PowerFlow</a:t>
                       </a:r>
-                      <a:endParaRPr lang="en-IN" b="1">
+                      <a:endParaRPr lang="en-IN" sz="1600" b="1">
                         <a:solidFill>
                           <a:srgbClr val="002060"/>
                         </a:solidFill>
@@ -17051,10 +17953,10 @@
                     <a:lstStyle/>
                     <a:p>
                       <a:r>
-                        <a:rPr lang="en-US"/>
+                        <a:rPr lang="en-US" sz="1600"/>
                         <a:t>Hard</a:t>
                       </a:r>
-                      <a:endParaRPr lang="en-IN"/>
+                      <a:endParaRPr lang="en-IN" sz="1600"/>
                     </a:p>
                   </a:txBody>
                   <a:tcPr/>
@@ -17065,10 +17967,10 @@
                     <a:lstStyle/>
                     <a:p>
                       <a:r>
-                        <a:rPr lang="en-US"/>
+                        <a:rPr lang="en-US" sz="1600"/>
                         <a:t>25</a:t>
                       </a:r>
-                      <a:endParaRPr lang="en-IN"/>
+                      <a:endParaRPr lang="en-IN" sz="1600"/>
                     </a:p>
                   </a:txBody>
                   <a:tcPr/>
@@ -17078,7 +17980,7 @@
                     <a:bodyPr/>
                     <a:lstStyle/>
                     <a:p>
-                      <a:endParaRPr lang="en-IN"/>
+                      <a:endParaRPr lang="en-IN" sz="1200" dirty="0"/>
                     </a:p>
                   </a:txBody>
                   <a:tcPr/>
@@ -17089,10 +17991,10 @@
                     <a:lstStyle/>
                     <a:p>
                       <a:r>
-                        <a:rPr lang="en-US"/>
+                        <a:rPr lang="en-US" sz="1600"/>
                         <a:t>-</a:t>
                       </a:r>
-                      <a:endParaRPr lang="en-IN"/>
+                      <a:endParaRPr lang="en-IN" sz="1600"/>
                     </a:p>
                   </a:txBody>
                   <a:tcPr/>
@@ -17110,7 +18012,7 @@
                     <a:lstStyle/>
                     <a:p>
                       <a:r>
-                        <a:rPr lang="en-US">
+                        <a:rPr lang="en-US" sz="1600">
                           <a:solidFill>
                             <a:schemeClr val="bg2">
                               <a:lumMod val="50000"/>
@@ -17119,7 +18021,7 @@
                         </a:rPr>
                         <a:t>2</a:t>
                       </a:r>
-                      <a:endParaRPr lang="en-IN">
+                      <a:endParaRPr lang="en-IN" sz="1600">
                         <a:solidFill>
                           <a:schemeClr val="bg2">
                             <a:lumMod val="50000"/>
@@ -17136,7 +18038,7 @@
                     <a:lstStyle/>
                     <a:p>
                       <a:r>
-                        <a:rPr lang="en-US" b="1" err="1">
+                        <a:rPr lang="en-US" sz="1600" b="1" err="1">
                           <a:solidFill>
                             <a:schemeClr val="bg2">
                               <a:lumMod val="50000"/>
@@ -17145,7 +18047,7 @@
                         </a:rPr>
                         <a:t>SparsePowerFlow</a:t>
                       </a:r>
-                      <a:endParaRPr lang="en-IN" b="1">
+                      <a:endParaRPr lang="en-IN" sz="1600" b="1">
                         <a:solidFill>
                           <a:schemeClr val="bg2">
                             <a:lumMod val="50000"/>
@@ -17162,10 +18064,10 @@
                     <a:lstStyle/>
                     <a:p>
                       <a:r>
-                        <a:rPr lang="en-US"/>
+                        <a:rPr lang="en-US" sz="1600"/>
                         <a:t>Very Hard</a:t>
                       </a:r>
-                      <a:endParaRPr lang="en-IN"/>
+                      <a:endParaRPr lang="en-IN" sz="1600"/>
                     </a:p>
                   </a:txBody>
                   <a:tcPr/>
@@ -17176,10 +18078,10 @@
                     <a:lstStyle/>
                     <a:p>
                       <a:r>
-                        <a:rPr lang="en-US"/>
+                        <a:rPr lang="en-US" sz="1600"/>
                         <a:t>50</a:t>
                       </a:r>
-                      <a:endParaRPr lang="en-IN"/>
+                      <a:endParaRPr lang="en-IN" sz="1600"/>
                     </a:p>
                   </a:txBody>
                   <a:tcPr/>
@@ -17190,10 +18092,10 @@
                     <a:lstStyle/>
                     <a:p>
                       <a:r>
-                        <a:rPr lang="en-US"/>
+                        <a:rPr lang="en-US" sz="1200" dirty="0"/>
                         <a:t>Most of the time spent in ideation.</a:t>
                       </a:r>
-                      <a:endParaRPr lang="en-IN"/>
+                      <a:endParaRPr lang="en-IN" sz="1200" dirty="0"/>
                     </a:p>
                   </a:txBody>
                   <a:tcPr/>
@@ -17204,10 +18106,10 @@
                     <a:lstStyle/>
                     <a:p>
                       <a:r>
-                        <a:rPr lang="en-US"/>
+                        <a:rPr lang="en-US" sz="1600"/>
                         <a:t>-</a:t>
                       </a:r>
-                      <a:endParaRPr lang="en-IN"/>
+                      <a:endParaRPr lang="en-IN" sz="1600"/>
                     </a:p>
                   </a:txBody>
                   <a:tcPr/>
@@ -17225,14 +18127,14 @@
                     <a:lstStyle/>
                     <a:p>
                       <a:r>
-                        <a:rPr lang="en-US" b="1">
+                        <a:rPr lang="en-US" sz="1600" b="1">
                           <a:solidFill>
                             <a:srgbClr val="C00000"/>
                           </a:solidFill>
                         </a:rPr>
                         <a:t>3</a:t>
                       </a:r>
-                      <a:endParaRPr lang="en-IN" b="1">
+                      <a:endParaRPr lang="en-IN" sz="1600" b="1">
                         <a:solidFill>
                           <a:srgbClr val="C00000"/>
                         </a:solidFill>
@@ -17247,14 +18149,14 @@
                     <a:lstStyle/>
                     <a:p>
                       <a:r>
-                        <a:rPr lang="en-US" b="1">
+                        <a:rPr lang="en-US" sz="1600" b="1">
                           <a:solidFill>
                             <a:srgbClr val="C00000"/>
                           </a:solidFill>
                         </a:rPr>
                         <a:t>ContinuationPowerFlow</a:t>
                       </a:r>
-                      <a:endParaRPr lang="en-IN" b="1">
+                      <a:endParaRPr lang="en-IN" sz="1600" b="1">
                         <a:solidFill>
                           <a:srgbClr val="C00000"/>
                         </a:solidFill>
@@ -17269,10 +18171,10 @@
                     <a:lstStyle/>
                     <a:p>
                       <a:r>
-                        <a:rPr lang="en-US"/>
+                        <a:rPr lang="en-US" sz="1600"/>
                         <a:t>Medium</a:t>
                       </a:r>
-                      <a:endParaRPr lang="en-IN"/>
+                      <a:endParaRPr lang="en-IN" sz="1600"/>
                     </a:p>
                   </a:txBody>
                   <a:tcPr/>
@@ -17283,10 +18185,10 @@
                     <a:lstStyle/>
                     <a:p>
                       <a:r>
-                        <a:rPr lang="en-US"/>
+                        <a:rPr lang="en-US" sz="1600"/>
                         <a:t>10</a:t>
                       </a:r>
-                      <a:endParaRPr lang="en-IN"/>
+                      <a:endParaRPr lang="en-IN" sz="1600"/>
                     </a:p>
                   </a:txBody>
                   <a:tcPr/>
@@ -17296,7 +18198,7 @@
                     <a:bodyPr/>
                     <a:lstStyle/>
                     <a:p>
-                      <a:endParaRPr lang="en-IN"/>
+                      <a:endParaRPr lang="en-IN" sz="1200" dirty="0"/>
                     </a:p>
                   </a:txBody>
                   <a:tcPr/>
@@ -17307,14 +18209,14 @@
                     <a:lstStyle/>
                     <a:p>
                       <a:r>
-                        <a:rPr lang="en-US" b="1">
+                        <a:rPr lang="en-US" sz="1600" b="1">
                           <a:solidFill>
                             <a:srgbClr val="002060"/>
                           </a:solidFill>
                         </a:rPr>
                         <a:t>P1</a:t>
                       </a:r>
-                      <a:endParaRPr lang="en-IN" b="1">
+                      <a:endParaRPr lang="en-IN" sz="1600" b="1">
                         <a:solidFill>
                           <a:srgbClr val="002060"/>
                         </a:solidFill>
@@ -17336,7 +18238,7 @@
                     <a:lstStyle/>
                     <a:p>
                       <a:r>
-                        <a:rPr lang="en-US" b="1">
+                        <a:rPr lang="en-US" sz="1600" b="1">
                           <a:solidFill>
                             <a:schemeClr val="accent6">
                               <a:lumMod val="75000"/>
@@ -17345,7 +18247,7 @@
                         </a:rPr>
                         <a:t>4</a:t>
                       </a:r>
-                      <a:endParaRPr lang="en-IN" b="1">
+                      <a:endParaRPr lang="en-IN" sz="1600" b="1">
                         <a:solidFill>
                           <a:schemeClr val="accent6">
                             <a:lumMod val="75000"/>
@@ -17362,7 +18264,7 @@
                     <a:lstStyle/>
                     <a:p>
                       <a:r>
-                        <a:rPr lang="en-US" b="1" err="1">
+                        <a:rPr lang="en-US" sz="1600" b="1" err="1">
                           <a:solidFill>
                             <a:schemeClr val="accent6">
                               <a:lumMod val="75000"/>
@@ -17371,7 +18273,7 @@
                         </a:rPr>
                         <a:t>StateEstimation</a:t>
                       </a:r>
-                      <a:endParaRPr lang="en-IN" b="1">
+                      <a:endParaRPr lang="en-IN" sz="1600" b="1">
                         <a:solidFill>
                           <a:schemeClr val="accent6">
                             <a:lumMod val="75000"/>
@@ -17388,10 +18290,10 @@
                     <a:lstStyle/>
                     <a:p>
                       <a:r>
-                        <a:rPr lang="en-US"/>
+                        <a:rPr lang="en-US" sz="1600"/>
                         <a:t>Hard</a:t>
                       </a:r>
-                      <a:endParaRPr lang="en-IN"/>
+                      <a:endParaRPr lang="en-IN" sz="1600"/>
                     </a:p>
                   </a:txBody>
                   <a:tcPr/>
@@ -17402,10 +18304,10 @@
                     <a:lstStyle/>
                     <a:p>
                       <a:r>
-                        <a:rPr lang="en-US"/>
+                        <a:rPr lang="en-US" sz="1600"/>
                         <a:t>25</a:t>
                       </a:r>
-                      <a:endParaRPr lang="en-IN"/>
+                      <a:endParaRPr lang="en-IN" sz="1600"/>
                     </a:p>
                   </a:txBody>
                   <a:tcPr/>
@@ -17416,10 +18318,10 @@
                     <a:lstStyle/>
                     <a:p>
                       <a:r>
-                        <a:rPr lang="en-US"/>
+                        <a:rPr lang="en-US" sz="1200" dirty="0"/>
                         <a:t>Was never implemented by me.</a:t>
                       </a:r>
-                      <a:endParaRPr lang="en-IN"/>
+                      <a:endParaRPr lang="en-IN" sz="1200" dirty="0"/>
                     </a:p>
                   </a:txBody>
                   <a:tcPr/>
@@ -17430,14 +18332,14 @@
                     <a:lstStyle/>
                     <a:p>
                       <a:r>
-                        <a:rPr lang="en-US" b="1">
+                        <a:rPr lang="en-US" sz="1600" b="1">
                           <a:solidFill>
                             <a:srgbClr val="002060"/>
                           </a:solidFill>
                         </a:rPr>
                         <a:t>P1</a:t>
                       </a:r>
-                      <a:endParaRPr lang="en-IN" b="1">
+                      <a:endParaRPr lang="en-IN" sz="1600" b="1">
                         <a:solidFill>
                           <a:srgbClr val="002060"/>
                         </a:solidFill>
@@ -17459,7 +18361,7 @@
                     <a:lstStyle/>
                     <a:p>
                       <a:r>
-                        <a:rPr lang="en-US" b="1">
+                        <a:rPr lang="en-US" sz="1600" b="1" dirty="0">
                           <a:solidFill>
                             <a:schemeClr val="accent2">
                               <a:lumMod val="75000"/>
@@ -17468,7 +18370,7 @@
                         </a:rPr>
                         <a:t>5</a:t>
                       </a:r>
-                      <a:endParaRPr lang="en-IN" b="1">
+                      <a:endParaRPr lang="en-IN" sz="1600" b="1" dirty="0">
                         <a:solidFill>
                           <a:schemeClr val="accent2">
                             <a:lumMod val="75000"/>
@@ -17485,7 +18387,7 @@
                     <a:lstStyle/>
                     <a:p>
                       <a:r>
-                        <a:rPr lang="en-US" b="1" err="1">
+                        <a:rPr lang="en-US" sz="1600" b="1" dirty="0" err="1">
                           <a:solidFill>
                             <a:schemeClr val="accent2">
                               <a:lumMod val="75000"/>
@@ -17494,7 +18396,7 @@
                         </a:rPr>
                         <a:t>OptimalPowerFlow</a:t>
                       </a:r>
-                      <a:endParaRPr lang="en-IN" b="1">
+                      <a:endParaRPr lang="en-IN" sz="1600" b="1" dirty="0">
                         <a:solidFill>
                           <a:schemeClr val="accent2">
                             <a:lumMod val="75000"/>
@@ -17511,10 +18413,10 @@
                     <a:lstStyle/>
                     <a:p>
                       <a:r>
-                        <a:rPr lang="en-US"/>
+                        <a:rPr lang="en-US" sz="1600" dirty="0"/>
                         <a:t>Hard</a:t>
                       </a:r>
-                      <a:endParaRPr lang="en-IN"/>
+                      <a:endParaRPr lang="en-IN" sz="1600" dirty="0"/>
                     </a:p>
                   </a:txBody>
                   <a:tcPr/>
@@ -17525,10 +18427,10 @@
                     <a:lstStyle/>
                     <a:p>
                       <a:r>
-                        <a:rPr lang="en-US"/>
+                        <a:rPr lang="en-US" sz="1600"/>
                         <a:t>25</a:t>
                       </a:r>
-                      <a:endParaRPr lang="en-IN"/>
+                      <a:endParaRPr lang="en-IN" sz="1600"/>
                     </a:p>
                   </a:txBody>
                   <a:tcPr/>
@@ -17539,10 +18441,10 @@
                     <a:lstStyle/>
                     <a:p>
                       <a:r>
-                        <a:rPr lang="en-US"/>
+                        <a:rPr lang="en-US" sz="1200" dirty="0"/>
                         <a:t>Has an easy part and a head-banging part.</a:t>
                       </a:r>
-                      <a:endParaRPr lang="en-IN"/>
+                      <a:endParaRPr lang="en-IN" sz="1200" dirty="0"/>
                     </a:p>
                   </a:txBody>
                   <a:tcPr/>
@@ -17553,14 +18455,14 @@
                     <a:lstStyle/>
                     <a:p>
                       <a:r>
-                        <a:rPr lang="en-US" b="1">
+                        <a:rPr lang="en-US" sz="1600" b="1" dirty="0">
                           <a:solidFill>
                             <a:srgbClr val="002060"/>
                           </a:solidFill>
                         </a:rPr>
                         <a:t>P1</a:t>
                       </a:r>
-                      <a:endParaRPr lang="en-IN" b="1">
+                      <a:endParaRPr lang="en-IN" sz="1600" b="1" dirty="0">
                         <a:solidFill>
                           <a:srgbClr val="002060"/>
                         </a:solidFill>
@@ -17572,6 +18474,216 @@
                 <a:extLst>
                   <a:ext uri="{0D108BD9-81ED-4DB2-BD59-A6C34878D82A}">
                     <a16:rowId xmlns:a16="http://schemas.microsoft.com/office/drawing/2014/main" val="3914988584"/>
+                  </a:ext>
+                </a:extLst>
+              </a:tr>
+              <a:tr h="370840">
+                <a:tc>
+                  <a:txBody>
+                    <a:bodyPr/>
+                    <a:lstStyle/>
+                    <a:p>
+                      <a:r>
+                        <a:rPr lang="en-IN" sz="1600" b="1" dirty="0">
+                          <a:solidFill>
+                            <a:srgbClr val="9558B2"/>
+                          </a:solidFill>
+                        </a:rPr>
+                        <a:t>6</a:t>
+                      </a:r>
+                    </a:p>
+                  </a:txBody>
+                  <a:tcPr/>
+                </a:tc>
+                <a:tc>
+                  <a:txBody>
+                    <a:bodyPr/>
+                    <a:lstStyle/>
+                    <a:p>
+                      <a:r>
+                        <a:rPr lang="en-IN" sz="1600" b="1" dirty="0" err="1">
+                          <a:solidFill>
+                            <a:srgbClr val="9558B2"/>
+                          </a:solidFill>
+                        </a:rPr>
+                        <a:t>SmallSignalStability</a:t>
+                      </a:r>
+                      <a:endParaRPr lang="en-IN" sz="1600" b="1" dirty="0">
+                        <a:solidFill>
+                          <a:srgbClr val="9558B2"/>
+                        </a:solidFill>
+                      </a:endParaRPr>
+                    </a:p>
+                  </a:txBody>
+                  <a:tcPr/>
+                </a:tc>
+                <a:tc>
+                  <a:txBody>
+                    <a:bodyPr/>
+                    <a:lstStyle/>
+                    <a:p>
+                      <a:r>
+                        <a:rPr lang="en-IN" sz="1600" dirty="0"/>
+                        <a:t>Hard</a:t>
+                      </a:r>
+                    </a:p>
+                  </a:txBody>
+                  <a:tcPr/>
+                </a:tc>
+                <a:tc>
+                  <a:txBody>
+                    <a:bodyPr/>
+                    <a:lstStyle/>
+                    <a:p>
+                      <a:r>
+                        <a:rPr lang="en-IN" sz="1600" dirty="0"/>
+                        <a:t>20</a:t>
+                      </a:r>
+                    </a:p>
+                  </a:txBody>
+                  <a:tcPr/>
+                </a:tc>
+                <a:tc>
+                  <a:txBody>
+                    <a:bodyPr/>
+                    <a:lstStyle/>
+                    <a:p>
+                      <a:r>
+                        <a:rPr lang="en-IN" sz="1200" dirty="0"/>
+                        <a:t>Clean, scalable setup requires time. Hard to get correct.</a:t>
+                      </a:r>
+                    </a:p>
+                  </a:txBody>
+                  <a:tcPr/>
+                </a:tc>
+                <a:tc>
+                  <a:txBody>
+                    <a:bodyPr/>
+                    <a:lstStyle/>
+                    <a:p>
+                      <a:r>
+                        <a:rPr lang="en-IN" sz="1600" b="1" dirty="0">
+                          <a:solidFill>
+                            <a:srgbClr val="002060"/>
+                          </a:solidFill>
+                        </a:rPr>
+                        <a:t>P1</a:t>
+                      </a:r>
+                    </a:p>
+                  </a:txBody>
+                  <a:tcPr/>
+                </a:tc>
+                <a:extLst>
+                  <a:ext uri="{0D108BD9-81ED-4DB2-BD59-A6C34878D82A}">
+                    <a16:rowId xmlns:a16="http://schemas.microsoft.com/office/drawing/2014/main" val="4216593914"/>
+                  </a:ext>
+                </a:extLst>
+              </a:tr>
+              <a:tr h="370840">
+                <a:tc>
+                  <a:txBody>
+                    <a:bodyPr/>
+                    <a:lstStyle/>
+                    <a:p>
+                      <a:r>
+                        <a:rPr lang="en-IN" sz="1600" b="1" dirty="0">
+                          <a:solidFill>
+                            <a:schemeClr val="accent2">
+                              <a:lumMod val="75000"/>
+                            </a:schemeClr>
+                          </a:solidFill>
+                        </a:rPr>
+                        <a:t>7</a:t>
+                      </a:r>
+                    </a:p>
+                  </a:txBody>
+                  <a:tcPr/>
+                </a:tc>
+                <a:tc>
+                  <a:txBody>
+                    <a:bodyPr/>
+                    <a:lstStyle/>
+                    <a:p>
+                      <a:r>
+                        <a:rPr lang="en-IN" sz="1600" b="1" dirty="0" err="1">
+                          <a:solidFill>
+                            <a:schemeClr val="accent2">
+                              <a:lumMod val="75000"/>
+                            </a:schemeClr>
+                          </a:solidFill>
+                        </a:rPr>
+                        <a:t>TransientStability</a:t>
+                      </a:r>
+                      <a:endParaRPr lang="en-IN" sz="1600" b="1" dirty="0">
+                        <a:solidFill>
+                          <a:schemeClr val="accent2">
+                            <a:lumMod val="75000"/>
+                          </a:schemeClr>
+                        </a:solidFill>
+                      </a:endParaRPr>
+                    </a:p>
+                  </a:txBody>
+                  <a:tcPr/>
+                </a:tc>
+                <a:tc>
+                  <a:txBody>
+                    <a:bodyPr/>
+                    <a:lstStyle/>
+                    <a:p>
+                      <a:r>
+                        <a:rPr lang="en-IN" sz="1600" dirty="0"/>
+                        <a:t>Hard</a:t>
+                      </a:r>
+                    </a:p>
+                  </a:txBody>
+                  <a:tcPr/>
+                </a:tc>
+                <a:tc>
+                  <a:txBody>
+                    <a:bodyPr/>
+                    <a:lstStyle/>
+                    <a:p>
+                      <a:r>
+                        <a:rPr lang="en-IN" sz="1600" dirty="0"/>
+                        <a:t>20</a:t>
+                      </a:r>
+                    </a:p>
+                  </a:txBody>
+                  <a:tcPr/>
+                </a:tc>
+                <a:tc>
+                  <a:txBody>
+                    <a:bodyPr/>
+                    <a:lstStyle/>
+                    <a:p>
+                      <a:r>
+                        <a:rPr lang="en-IN" sz="1200" dirty="0"/>
+                        <a:t>Type 2 (easy to model, assuming good P6) and Type 1 (more involved) never done by me.</a:t>
+                      </a:r>
+                    </a:p>
+                  </a:txBody>
+                  <a:tcPr/>
+                </a:tc>
+                <a:tc>
+                  <a:txBody>
+                    <a:bodyPr/>
+                    <a:lstStyle/>
+                    <a:p>
+                      <a:r>
+                        <a:rPr lang="en-IN" sz="1600" b="1" dirty="0">
+                          <a:solidFill>
+                            <a:srgbClr val="9558B2"/>
+                          </a:solidFill>
+                        </a:rPr>
+                        <a:t>P6</a:t>
+                      </a:r>
+                    </a:p>
+                  </a:txBody>
+                  <a:tcPr/>
+                </a:tc>
+                <a:extLst>
+                  <a:ext uri="{0D108BD9-81ED-4DB2-BD59-A6C34878D82A}">
+                    <a16:rowId xmlns:a16="http://schemas.microsoft.com/office/drawing/2014/main" val="2617982693"/>
                   </a:ext>
                 </a:extLst>
               </a:tr>
@@ -17592,7 +18704,7 @@
 </p:sld>
 </file>
 
-<file path=ppt/slides/slide37.xml><?xml version="1.0" encoding="utf-8"?>
+<file path=ppt/slides/slide39.xml><?xml version="1.0" encoding="utf-8"?>
 <p:sld xmlns:a="http://schemas.openxmlformats.org/drawingml/2006/main" xmlns:r="http://schemas.openxmlformats.org/officeDocument/2006/relationships" xmlns:p="http://schemas.openxmlformats.org/presentationml/2006/main">
   <p:cSld>
     <p:spTree>
@@ -17717,110 +18829,6 @@
     <p:extLst>
       <p:ext uri="{BB962C8B-B14F-4D97-AF65-F5344CB8AC3E}">
         <p14:creationId xmlns:p14="http://schemas.microsoft.com/office/powerpoint/2010/main" val="2374138527"/>
-      </p:ext>
-    </p:extLst>
-  </p:cSld>
-  <p:clrMapOvr>
-    <a:masterClrMapping/>
-  </p:clrMapOvr>
-</p:sld>
-</file>
-
-<file path=ppt/slides/slide38.xml><?xml version="1.0" encoding="utf-8"?>
-<p:sld xmlns:a="http://schemas.openxmlformats.org/drawingml/2006/main" xmlns:r="http://schemas.openxmlformats.org/officeDocument/2006/relationships" xmlns:p="http://schemas.openxmlformats.org/presentationml/2006/main">
-  <p:cSld>
-    <p:spTree>
-      <p:nvGrpSpPr>
-        <p:cNvPr id="1" name=""/>
-        <p:cNvGrpSpPr/>
-        <p:nvPr/>
-      </p:nvGrpSpPr>
-      <p:grpSpPr>
-        <a:xfrm>
-          <a:off x="0" y="0"/>
-          <a:ext cx="0" cy="0"/>
-          <a:chOff x="0" y="0"/>
-          <a:chExt cx="0" cy="0"/>
-        </a:xfrm>
-      </p:grpSpPr>
-      <p:sp>
-        <p:nvSpPr>
-          <p:cNvPr id="2" name="Title 1">
-            <a:extLst>
-              <a:ext uri="{FF2B5EF4-FFF2-40B4-BE49-F238E27FC236}">
-                <a16:creationId xmlns:a16="http://schemas.microsoft.com/office/drawing/2014/main" id="{D6138808-F977-394F-1A5B-61193AE2BE99}"/>
-              </a:ext>
-            </a:extLst>
-          </p:cNvPr>
-          <p:cNvSpPr>
-            <a:spLocks noGrp="1"/>
-          </p:cNvSpPr>
-          <p:nvPr>
-            <p:ph type="title"/>
-          </p:nvPr>
-        </p:nvSpPr>
-        <p:spPr/>
-        <p:txBody>
-          <a:bodyPr/>
-          <a:lstStyle/>
-          <a:p>
-            <a:pPr algn="ctr"/>
-            <a:r>
-              <a:rPr lang="en-US">
-                <a:latin typeface="Calisto MT" panose="02040603050505030304" pitchFamily="18" charset="0"/>
-              </a:rPr>
-              <a:t>May our </a:t>
-            </a:r>
-            <a:r>
-              <a:rPr lang="en-US">
-                <a:solidFill>
-                  <a:srgbClr val="7030A0"/>
-                </a:solidFill>
-                <a:latin typeface="Calisto MT" panose="02040603050505030304" pitchFamily="18" charset="0"/>
-              </a:rPr>
-              <a:t>package</a:t>
-            </a:r>
-            <a:r>
-              <a:rPr lang="en-US">
-                <a:latin typeface="Calisto MT" panose="02040603050505030304" pitchFamily="18" charset="0"/>
-              </a:rPr>
-              <a:t> be glorious!</a:t>
-            </a:r>
-            <a:endParaRPr lang="en-IN">
-              <a:latin typeface="Calisto MT" panose="02040603050505030304" pitchFamily="18" charset="0"/>
-            </a:endParaRPr>
-          </a:p>
-        </p:txBody>
-      </p:sp>
-      <p:sp>
-        <p:nvSpPr>
-          <p:cNvPr id="3" name="Content Placeholder 2">
-            <a:extLst>
-              <a:ext uri="{FF2B5EF4-FFF2-40B4-BE49-F238E27FC236}">
-                <a16:creationId xmlns:a16="http://schemas.microsoft.com/office/drawing/2014/main" id="{908D5652-B405-EAC9-EA04-B2BDE3482E0E}"/>
-              </a:ext>
-            </a:extLst>
-          </p:cNvPr>
-          <p:cNvSpPr>
-            <a:spLocks noGrp="1"/>
-          </p:cNvSpPr>
-          <p:nvPr>
-            <p:ph idx="1"/>
-          </p:nvPr>
-        </p:nvSpPr>
-        <p:spPr/>
-        <p:txBody>
-          <a:bodyPr/>
-          <a:lstStyle/>
-          <a:p>
-            <a:endParaRPr lang="en-IN"/>
-          </a:p>
-        </p:txBody>
-      </p:sp>
-    </p:spTree>
-    <p:extLst>
-      <p:ext uri="{BB962C8B-B14F-4D97-AF65-F5344CB8AC3E}">
-        <p14:creationId xmlns:p14="http://schemas.microsoft.com/office/powerpoint/2010/main" val="2725558992"/>
       </p:ext>
     </p:extLst>
   </p:cSld>
@@ -18056,6 +19064,110 @@
     <p:extLst>
       <p:ext uri="{BB962C8B-B14F-4D97-AF65-F5344CB8AC3E}">
         <p14:creationId xmlns:p14="http://schemas.microsoft.com/office/powerpoint/2010/main" val="1141745103"/>
+      </p:ext>
+    </p:extLst>
+  </p:cSld>
+  <p:clrMapOvr>
+    <a:masterClrMapping/>
+  </p:clrMapOvr>
+</p:sld>
+</file>
+
+<file path=ppt/slides/slide40.xml><?xml version="1.0" encoding="utf-8"?>
+<p:sld xmlns:a="http://schemas.openxmlformats.org/drawingml/2006/main" xmlns:r="http://schemas.openxmlformats.org/officeDocument/2006/relationships" xmlns:p="http://schemas.openxmlformats.org/presentationml/2006/main">
+  <p:cSld>
+    <p:spTree>
+      <p:nvGrpSpPr>
+        <p:cNvPr id="1" name=""/>
+        <p:cNvGrpSpPr/>
+        <p:nvPr/>
+      </p:nvGrpSpPr>
+      <p:grpSpPr>
+        <a:xfrm>
+          <a:off x="0" y="0"/>
+          <a:ext cx="0" cy="0"/>
+          <a:chOff x="0" y="0"/>
+          <a:chExt cx="0" cy="0"/>
+        </a:xfrm>
+      </p:grpSpPr>
+      <p:sp>
+        <p:nvSpPr>
+          <p:cNvPr id="2" name="Title 1">
+            <a:extLst>
+              <a:ext uri="{FF2B5EF4-FFF2-40B4-BE49-F238E27FC236}">
+                <a16:creationId xmlns:a16="http://schemas.microsoft.com/office/drawing/2014/main" id="{D6138808-F977-394F-1A5B-61193AE2BE99}"/>
+              </a:ext>
+            </a:extLst>
+          </p:cNvPr>
+          <p:cNvSpPr>
+            <a:spLocks noGrp="1"/>
+          </p:cNvSpPr>
+          <p:nvPr>
+            <p:ph type="title"/>
+          </p:nvPr>
+        </p:nvSpPr>
+        <p:spPr/>
+        <p:txBody>
+          <a:bodyPr/>
+          <a:lstStyle/>
+          <a:p>
+            <a:pPr algn="ctr"/>
+            <a:r>
+              <a:rPr lang="en-US">
+                <a:latin typeface="Calisto MT" panose="02040603050505030304" pitchFamily="18" charset="0"/>
+              </a:rPr>
+              <a:t>May our </a:t>
+            </a:r>
+            <a:r>
+              <a:rPr lang="en-US">
+                <a:solidFill>
+                  <a:srgbClr val="7030A0"/>
+                </a:solidFill>
+                <a:latin typeface="Calisto MT" panose="02040603050505030304" pitchFamily="18" charset="0"/>
+              </a:rPr>
+              <a:t>package</a:t>
+            </a:r>
+            <a:r>
+              <a:rPr lang="en-US">
+                <a:latin typeface="Calisto MT" panose="02040603050505030304" pitchFamily="18" charset="0"/>
+              </a:rPr>
+              <a:t> be glorious!</a:t>
+            </a:r>
+            <a:endParaRPr lang="en-IN">
+              <a:latin typeface="Calisto MT" panose="02040603050505030304" pitchFamily="18" charset="0"/>
+            </a:endParaRPr>
+          </a:p>
+        </p:txBody>
+      </p:sp>
+      <p:sp>
+        <p:nvSpPr>
+          <p:cNvPr id="3" name="Content Placeholder 2">
+            <a:extLst>
+              <a:ext uri="{FF2B5EF4-FFF2-40B4-BE49-F238E27FC236}">
+                <a16:creationId xmlns:a16="http://schemas.microsoft.com/office/drawing/2014/main" id="{908D5652-B405-EAC9-EA04-B2BDE3482E0E}"/>
+              </a:ext>
+            </a:extLst>
+          </p:cNvPr>
+          <p:cNvSpPr>
+            <a:spLocks noGrp="1"/>
+          </p:cNvSpPr>
+          <p:nvPr>
+            <p:ph idx="1"/>
+          </p:nvPr>
+        </p:nvSpPr>
+        <p:spPr/>
+        <p:txBody>
+          <a:bodyPr/>
+          <a:lstStyle/>
+          <a:p>
+            <a:endParaRPr lang="en-IN"/>
+          </a:p>
+        </p:txBody>
+      </p:sp>
+    </p:spTree>
+    <p:extLst>
+      <p:ext uri="{BB962C8B-B14F-4D97-AF65-F5344CB8AC3E}">
+        <p14:creationId xmlns:p14="http://schemas.microsoft.com/office/powerpoint/2010/main" val="2725558992"/>
       </p:ext>
     </p:extLst>
   </p:cSld>
@@ -18506,8 +19618,8 @@
           </a:p>
         </p:txBody>
       </p:sp>
-      <mc:AlternateContent xmlns:mc="http://schemas.openxmlformats.org/markup-compatibility/2006">
-        <mc:Choice xmlns:a14="http://schemas.microsoft.com/office/drawing/2010/main" Requires="a14">
+      <mc:AlternateContent xmlns:mc="http://schemas.openxmlformats.org/markup-compatibility/2006" xmlns:a14="http://schemas.microsoft.com/office/drawing/2010/main">
+        <mc:Choice Requires="a14">
           <p:sp>
             <p:nvSpPr>
               <p:cNvPr id="3" name="Content Placeholder 2">
@@ -19245,7 +20357,7 @@
             </p:txBody>
           </p:sp>
         </mc:Choice>
-        <mc:Fallback>
+        <mc:Fallback xmlns="">
           <p:sp>
             <p:nvSpPr>
               <p:cNvPr id="3" name="Content Placeholder 2">
@@ -20514,15 +21626,6 @@
 </file>
 
 <file path=customXml/item1.xml><?xml version="1.0" encoding="utf-8"?>
-<?mso-contentType ?>
-<FormTemplates xmlns="http://schemas.microsoft.com/sharepoint/v3/contenttype/forms">
-  <Display>DocumentLibraryForm</Display>
-  <Edit>DocumentLibraryForm</Edit>
-  <New>DocumentLibraryForm</New>
-</FormTemplates>
-</file>
-
-<file path=customXml/item2.xml><?xml version="1.0" encoding="utf-8"?>
 <ct:contentTypeSchema xmlns:ct="http://schemas.microsoft.com/office/2006/metadata/contentType" xmlns:ma="http://schemas.microsoft.com/office/2006/metadata/properties/metaAttributes" ct:_="" ma:_="" ma:contentTypeName="Document" ma:contentTypeID="0x0101008EDD631CF16A9D4597B7910261C15C8D" ma:contentTypeVersion="8" ma:contentTypeDescription="Create a new document." ma:contentTypeScope="" ma:versionID="6df697ab8c469b327c4ca0ad6150b4d8">
   <xsd:schema xmlns:xsd="http://www.w3.org/2001/XMLSchema" xmlns:xs="http://www.w3.org/2001/XMLSchema" xmlns:p="http://schemas.microsoft.com/office/2006/metadata/properties" xmlns:ns3="07b86a79-a0e0-4fae-97d8-d960552457a2" xmlns:ns4="40f16175-07f6-4179-a7d3-44240c48c007" targetNamespace="http://schemas.microsoft.com/office/2006/metadata/properties" ma:root="true" ma:fieldsID="82c1df116234835aaac4f6705de5e513" ns3:_="" ns4:_="">
     <xsd:import namespace="07b86a79-a0e0-4fae-97d8-d960552457a2"/>
@@ -20711,6 +21814,15 @@
 </ct:contentTypeSchema>
 </file>
 
+<file path=customXml/item2.xml><?xml version="1.0" encoding="utf-8"?>
+<?mso-contentType ?>
+<FormTemplates xmlns="http://schemas.microsoft.com/sharepoint/v3/contenttype/forms">
+  <Display>DocumentLibraryForm</Display>
+  <Edit>DocumentLibraryForm</Edit>
+  <New>DocumentLibraryForm</New>
+</FormTemplates>
+</file>
+
 <file path=customXml/item3.xml><?xml version="1.0" encoding="utf-8"?>
 <p:properties xmlns:p="http://schemas.microsoft.com/office/2006/metadata/properties" xmlns:xsi="http://www.w3.org/2001/XMLSchema-instance" xmlns:pc="http://schemas.microsoft.com/office/infopath/2007/PartnerControls">
   <documentManagement>
@@ -20720,14 +21832,6 @@
 </file>
 
 <file path=customXml/itemProps1.xml><?xml version="1.0" encoding="utf-8"?>
-<ds:datastoreItem xmlns:ds="http://schemas.openxmlformats.org/officeDocument/2006/customXml" ds:itemID="{8397E5B5-CBAB-4D43-BECA-E802B196F34B}">
-  <ds:schemaRefs>
-    <ds:schemaRef ds:uri="http://schemas.microsoft.com/sharepoint/v3/contenttype/forms"/>
-  </ds:schemaRefs>
-</ds:datastoreItem>
-</file>
-
-<file path=customXml/itemProps2.xml><?xml version="1.0" encoding="utf-8"?>
 <ds:datastoreItem xmlns:ds="http://schemas.openxmlformats.org/officeDocument/2006/customXml" ds:itemID="{837DA910-2E67-4D61-A7CC-4E283793B666}">
   <ds:schemaRefs>
     <ds:schemaRef ds:uri="07b86a79-a0e0-4fae-97d8-d960552457a2"/>
@@ -20742,6 +21846,14 @@
     <ds:schemaRef ds:uri="http://schemas.microsoft.com/office/infopath/2007/PartnerControls"/>
     <ds:schemaRef ds:uri="http://schemas.openxmlformats.org/package/2006/metadata/core-properties"/>
     <ds:schemaRef ds:uri="http://www.w3.org/2001/XMLSchema"/>
+  </ds:schemaRefs>
+</ds:datastoreItem>
+</file>
+
+<file path=customXml/itemProps2.xml><?xml version="1.0" encoding="utf-8"?>
+<ds:datastoreItem xmlns:ds="http://schemas.openxmlformats.org/officeDocument/2006/customXml" ds:itemID="{8397E5B5-CBAB-4D43-BECA-E802B196F34B}">
+  <ds:schemaRefs>
+    <ds:schemaRef ds:uri="http://schemas.microsoft.com/sharepoint/v3/contenttype/forms"/>
   </ds:schemaRefs>
 </ds:datastoreItem>
 </file>

</xml_diff>